<commit_message>
changed java presentation file
</commit_message>
<xml_diff>
--- a/Java Intro.pptx
+++ b/Java Intro.pptx
@@ -4136,7 +4136,7 @@
         </p:spPr>
         <p:txBody>
           <a:bodyPr>
-            <a:normAutofit fontScale="67500" lnSpcReduction="20000"/>
+            <a:normAutofit fontScale="60000" lnSpcReduction="20000"/>
           </a:bodyPr>
           <a:lstStyle/>
           <a:p>
@@ -4206,7 +4206,7 @@
           <a:p>
             <a:r>
               <a:rPr lang="en-US" dirty="0"/>
-              <a:t>git add . – if a new file a created it wis generally untracked. We need to track it. We use the git add . Command to track. Note the dot tells us to track all the files. If you want to track individual files, we can add the names </a:t>
+              <a:t>git add . – if a new file a created it wis generally untracked. We need to track it. We use the git add . Command to track. This is called staging the changes. Note the dot tells us to track all the files. If you want to track individual files, we can add the names </a:t>
             </a:r>
             <a:r>
               <a:rPr lang="en-US" dirty="0" err="1"/>
@@ -4214,25 +4214,47 @@
             </a:r>
             <a:r>
               <a:rPr lang="en-US" dirty="0"/>
-              <a:t> of the dot. Mostly we </a:t>
-            </a:r>
-            <a:r>
-              <a:rPr lang="en-US"/>
-              <a:t>use the dot.</a:t>
+              <a:t> of the dot. Mostly we use the dot. </a:t>
+            </a:r>
+          </a:p>
+          <a:p>
+            <a:r>
+              <a:rPr lang="en-US" dirty="0"/>
+              <a:t>git commit – This command commits the changed. It creates a new snapshot that git can remember.</a:t>
+            </a:r>
+          </a:p>
+          <a:p>
+            <a:pPr marL="0" indent="0">
+              <a:buNone/>
+            </a:pPr>
+            <a:r>
+              <a:rPr lang="en-US" dirty="0"/>
+              <a:t>	git commit –m “Message related to commit.”</a:t>
+            </a:r>
+          </a:p>
+          <a:p>
+            <a:pPr marL="0" indent="0">
+              <a:buNone/>
+            </a:pPr>
+            <a:r>
+              <a:rPr lang="en-US" dirty="0"/>
+              <a:t>The message helps to understand what the commit is about.  Everything till this is on your computer.</a:t>
+            </a:r>
+          </a:p>
+          <a:p>
+            <a:r>
+              <a:rPr lang="en-US" dirty="0"/>
+              <a:t>git push – git push helps to upload the snapshots to </a:t>
+            </a:r>
+            <a:r>
+              <a:rPr lang="en-US" dirty="0" err="1"/>
+              <a:t>github</a:t>
+            </a:r>
+            <a:r>
+              <a:rPr lang="en-US"/>
+              <a:t>.</a:t>
             </a:r>
             <a:endParaRPr lang="en-US" dirty="0"/>
-          </a:p>
-          <a:p>
-            <a:r>
-              <a:rPr lang="en-US" dirty="0"/>
-              <a:t>git commit</a:t>
-            </a:r>
-          </a:p>
-          <a:p>
-            <a:r>
-              <a:rPr lang="en-US" dirty="0"/>
-              <a:t>git push</a:t>
-            </a:r>
           </a:p>
           <a:p>
             <a:r>

</xml_diff>